<commit_message>
added read the docs stuff
</commit_message>
<xml_diff>
--- a/docs/source/_static/framework.pptx
+++ b/docs/source/_static/framework.pptx
@@ -104,6 +104,11 @@
       </a:defRPr>
     </a:lvl9pPr>
   </p:defaultTextStyle>
+  <p:extLst>
+    <p:ext uri="{EFAFB233-063F-42B5-8137-9DF3F51BA10A}">
+      <p15:sldGuideLst xmlns:p15="http://schemas.microsoft.com/office/powerpoint/2012/main"/>
+    </p:ext>
+  </p:extLst>
 </p:presentation>
 </file>
 
@@ -254,7 +259,7 @@
           <a:p>
             <a:fld id="{CFC2D44E-6071-2A4C-9174-F8E89F6BEA84}" type="datetimeFigureOut">
               <a:rPr lang="en-US" smtClean="0"/>
-              <a:t>4/16/24</a:t>
+              <a:t>4/17/24</a:t>
             </a:fld>
             <a:endParaRPr lang="en-US"/>
           </a:p>
@@ -452,7 +457,7 @@
           <a:p>
             <a:fld id="{CFC2D44E-6071-2A4C-9174-F8E89F6BEA84}" type="datetimeFigureOut">
               <a:rPr lang="en-US" smtClean="0"/>
-              <a:t>4/16/24</a:t>
+              <a:t>4/17/24</a:t>
             </a:fld>
             <a:endParaRPr lang="en-US"/>
           </a:p>
@@ -660,7 +665,7 @@
           <a:p>
             <a:fld id="{CFC2D44E-6071-2A4C-9174-F8E89F6BEA84}" type="datetimeFigureOut">
               <a:rPr lang="en-US" smtClean="0"/>
-              <a:t>4/16/24</a:t>
+              <a:t>4/17/24</a:t>
             </a:fld>
             <a:endParaRPr lang="en-US"/>
           </a:p>
@@ -858,7 +863,7 @@
           <a:p>
             <a:fld id="{CFC2D44E-6071-2A4C-9174-F8E89F6BEA84}" type="datetimeFigureOut">
               <a:rPr lang="en-US" smtClean="0"/>
-              <a:t>4/16/24</a:t>
+              <a:t>4/17/24</a:t>
             </a:fld>
             <a:endParaRPr lang="en-US"/>
           </a:p>
@@ -1133,7 +1138,7 @@
           <a:p>
             <a:fld id="{CFC2D44E-6071-2A4C-9174-F8E89F6BEA84}" type="datetimeFigureOut">
               <a:rPr lang="en-US" smtClean="0"/>
-              <a:t>4/16/24</a:t>
+              <a:t>4/17/24</a:t>
             </a:fld>
             <a:endParaRPr lang="en-US"/>
           </a:p>
@@ -1398,7 +1403,7 @@
           <a:p>
             <a:fld id="{CFC2D44E-6071-2A4C-9174-F8E89F6BEA84}" type="datetimeFigureOut">
               <a:rPr lang="en-US" smtClean="0"/>
-              <a:t>4/16/24</a:t>
+              <a:t>4/17/24</a:t>
             </a:fld>
             <a:endParaRPr lang="en-US"/>
           </a:p>
@@ -1810,7 +1815,7 @@
           <a:p>
             <a:fld id="{CFC2D44E-6071-2A4C-9174-F8E89F6BEA84}" type="datetimeFigureOut">
               <a:rPr lang="en-US" smtClean="0"/>
-              <a:t>4/16/24</a:t>
+              <a:t>4/17/24</a:t>
             </a:fld>
             <a:endParaRPr lang="en-US"/>
           </a:p>
@@ -1951,7 +1956,7 @@
           <a:p>
             <a:fld id="{CFC2D44E-6071-2A4C-9174-F8E89F6BEA84}" type="datetimeFigureOut">
               <a:rPr lang="en-US" smtClean="0"/>
-              <a:t>4/16/24</a:t>
+              <a:t>4/17/24</a:t>
             </a:fld>
             <a:endParaRPr lang="en-US"/>
           </a:p>
@@ -2064,7 +2069,7 @@
           <a:p>
             <a:fld id="{CFC2D44E-6071-2A4C-9174-F8E89F6BEA84}" type="datetimeFigureOut">
               <a:rPr lang="en-US" smtClean="0"/>
-              <a:t>4/16/24</a:t>
+              <a:t>4/17/24</a:t>
             </a:fld>
             <a:endParaRPr lang="en-US"/>
           </a:p>
@@ -2375,7 +2380,7 @@
           <a:p>
             <a:fld id="{CFC2D44E-6071-2A4C-9174-F8E89F6BEA84}" type="datetimeFigureOut">
               <a:rPr lang="en-US" smtClean="0"/>
-              <a:t>4/16/24</a:t>
+              <a:t>4/17/24</a:t>
             </a:fld>
             <a:endParaRPr lang="en-US"/>
           </a:p>
@@ -2663,7 +2668,7 @@
           <a:p>
             <a:fld id="{CFC2D44E-6071-2A4C-9174-F8E89F6BEA84}" type="datetimeFigureOut">
               <a:rPr lang="en-US" smtClean="0"/>
-              <a:t>4/16/24</a:t>
+              <a:t>4/17/24</a:t>
             </a:fld>
             <a:endParaRPr lang="en-US"/>
           </a:p>
@@ -2904,7 +2909,7 @@
           <a:p>
             <a:fld id="{CFC2D44E-6071-2A4C-9174-F8E89F6BEA84}" type="datetimeFigureOut">
               <a:rPr lang="en-US" smtClean="0"/>
-              <a:t>4/16/24</a:t>
+              <a:t>4/17/24</a:t>
             </a:fld>
             <a:endParaRPr lang="en-US"/>
           </a:p>
@@ -3335,8 +3340,8 @@
         </p:nvSpPr>
         <p:spPr>
           <a:xfrm>
-            <a:off x="3819569" y="2158611"/>
-            <a:ext cx="3262718" cy="3853234"/>
+            <a:off x="2252742" y="1883135"/>
+            <a:ext cx="3052504" cy="3850640"/>
           </a:xfrm>
           <a:prstGeom prst="rect">
             <a:avLst/>
@@ -3390,14 +3395,14 @@
               <a:buChar char="•"/>
             </a:pPr>
             <a:r>
-              <a:rPr lang="en-US" dirty="0">
+              <a:rPr lang="en-US" sz="1400" dirty="0">
                 <a:solidFill>
-                  <a:schemeClr val="tx1"/>
+                  <a:schemeClr val="accent1"/>
                 </a:solidFill>
                 <a:latin typeface="Calibri" panose="020F0502020204030204" pitchFamily="34" charset="0"/>
                 <a:cs typeface="Calibri" panose="020F0502020204030204" pitchFamily="34" charset="0"/>
               </a:rPr>
-              <a:t>Multi-sample reports</a:t>
+              <a:t>Folder</a:t>
             </a:r>
           </a:p>
           <a:p>
@@ -3406,14 +3411,14 @@
               <a:buChar char="•"/>
             </a:pPr>
             <a:r>
-              <a:rPr lang="en-US" dirty="0">
+              <a:rPr lang="en-US" sz="1400" dirty="0">
                 <a:solidFill>
-                  <a:schemeClr val="tx1"/>
+                  <a:schemeClr val="accent1"/>
                 </a:solidFill>
                 <a:latin typeface="Calibri" panose="020F0502020204030204" pitchFamily="34" charset="0"/>
                 <a:cs typeface="Calibri" panose="020F0502020204030204" pitchFamily="34" charset="0"/>
               </a:rPr>
-              <a:t>Multi-sample plots</a:t>
+              <a:t>Project-level parameters</a:t>
             </a:r>
           </a:p>
         </p:txBody>
@@ -3432,7 +3437,7 @@
         </p:nvSpPr>
         <p:spPr>
           <a:xfrm>
-            <a:off x="4164676" y="5278485"/>
+            <a:off x="2451489" y="4994705"/>
             <a:ext cx="647519" cy="655415"/>
           </a:xfrm>
           <a:prstGeom prst="rect">
@@ -3471,7 +3476,14 @@
           <a:lstStyle/>
           <a:p>
             <a:pPr algn="ctr"/>
-            <a:endParaRPr lang="en-US"/>
+            <a:r>
+              <a:rPr lang="en-US" sz="1400" dirty="0">
+                <a:solidFill>
+                  <a:schemeClr val="accent2"/>
+                </a:solidFill>
+              </a:rPr>
+              <a:t>File 3</a:t>
+            </a:r>
           </a:p>
         </p:txBody>
       </p:sp>
@@ -3489,7 +3501,7 @@
         </p:nvSpPr>
         <p:spPr>
           <a:xfrm>
-            <a:off x="4164676" y="4513962"/>
+            <a:off x="2451489" y="4230182"/>
             <a:ext cx="647519" cy="655415"/>
           </a:xfrm>
           <a:prstGeom prst="rect">
@@ -3528,7 +3540,14 @@
           <a:lstStyle/>
           <a:p>
             <a:pPr algn="ctr"/>
-            <a:endParaRPr lang="en-US"/>
+            <a:r>
+              <a:rPr lang="en-US" sz="1400" dirty="0">
+                <a:solidFill>
+                  <a:schemeClr val="accent2"/>
+                </a:solidFill>
+              </a:rPr>
+              <a:t>File 2</a:t>
+            </a:r>
           </a:p>
         </p:txBody>
       </p:sp>
@@ -3546,7 +3565,7 @@
         </p:nvSpPr>
         <p:spPr>
           <a:xfrm>
-            <a:off x="4169496" y="3749439"/>
+            <a:off x="2456309" y="3465659"/>
             <a:ext cx="647519" cy="655415"/>
           </a:xfrm>
           <a:prstGeom prst="rect">
@@ -3585,7 +3604,14 @@
           <a:lstStyle/>
           <a:p>
             <a:pPr algn="ctr"/>
-            <a:endParaRPr lang="en-US" b="1" dirty="0"/>
+            <a:r>
+              <a:rPr lang="en-US" sz="1400" dirty="0">
+                <a:solidFill>
+                  <a:schemeClr val="accent2"/>
+                </a:solidFill>
+              </a:rPr>
+              <a:t>File 1</a:t>
+            </a:r>
           </a:p>
         </p:txBody>
       </p:sp>
@@ -3603,8 +3629,8 @@
         </p:nvSpPr>
         <p:spPr>
           <a:xfrm>
-            <a:off x="5236420" y="5336087"/>
-            <a:ext cx="535140" cy="592689"/>
+            <a:off x="3467044" y="5052307"/>
+            <a:ext cx="647519" cy="592689"/>
           </a:xfrm>
           <a:prstGeom prst="rect">
             <a:avLst/>
@@ -3642,7 +3668,14 @@
           <a:lstStyle/>
           <a:p>
             <a:pPr algn="ctr"/>
-            <a:endParaRPr lang="en-US"/>
+            <a:r>
+              <a:rPr lang="en-US" sz="1400" dirty="0">
+                <a:solidFill>
+                  <a:schemeClr val="accent4"/>
+                </a:solidFill>
+              </a:rPr>
+              <a:t>File 3</a:t>
+            </a:r>
           </a:p>
         </p:txBody>
       </p:sp>
@@ -3660,8 +3693,8 @@
         </p:nvSpPr>
         <p:spPr>
           <a:xfrm>
-            <a:off x="5236419" y="4625602"/>
-            <a:ext cx="535140" cy="592689"/>
+            <a:off x="3467043" y="4341822"/>
+            <a:ext cx="647519" cy="592689"/>
           </a:xfrm>
           <a:prstGeom prst="rect">
             <a:avLst/>
@@ -3699,7 +3732,14 @@
           <a:lstStyle/>
           <a:p>
             <a:pPr algn="ctr"/>
-            <a:endParaRPr lang="en-US"/>
+            <a:r>
+              <a:rPr lang="en-US" sz="1400" dirty="0">
+                <a:solidFill>
+                  <a:schemeClr val="accent4"/>
+                </a:solidFill>
+              </a:rPr>
+              <a:t>File  2</a:t>
+            </a:r>
           </a:p>
         </p:txBody>
       </p:sp>
@@ -3717,8 +3757,8 @@
         </p:nvSpPr>
         <p:spPr>
           <a:xfrm>
-            <a:off x="5236419" y="3915117"/>
-            <a:ext cx="535140" cy="592689"/>
+            <a:off x="3467043" y="3631337"/>
+            <a:ext cx="647519" cy="592689"/>
           </a:xfrm>
           <a:prstGeom prst="rect">
             <a:avLst/>
@@ -3756,7 +3796,14 @@
           <a:lstStyle/>
           <a:p>
             <a:pPr algn="ctr"/>
-            <a:endParaRPr lang="en-US" b="1" dirty="0"/>
+            <a:r>
+              <a:rPr lang="en-US" sz="1400" dirty="0">
+                <a:solidFill>
+                  <a:schemeClr val="accent4"/>
+                </a:solidFill>
+              </a:rPr>
+              <a:t>File 1</a:t>
+            </a:r>
           </a:p>
         </p:txBody>
       </p:sp>
@@ -3774,7 +3821,7 @@
         </p:nvSpPr>
         <p:spPr>
           <a:xfrm>
-            <a:off x="6061994" y="5429175"/>
+            <a:off x="4348807" y="5145395"/>
             <a:ext cx="712271" cy="492423"/>
           </a:xfrm>
           <a:prstGeom prst="rect">
@@ -3813,7 +3860,14 @@
           <a:lstStyle/>
           <a:p>
             <a:pPr algn="ctr"/>
-            <a:endParaRPr lang="en-US"/>
+            <a:r>
+              <a:rPr lang="en-US" sz="1400" dirty="0">
+                <a:solidFill>
+                  <a:schemeClr val="accent3"/>
+                </a:solidFill>
+              </a:rPr>
+              <a:t>File 3</a:t>
+            </a:r>
           </a:p>
         </p:txBody>
       </p:sp>
@@ -3831,7 +3885,7 @@
         </p:nvSpPr>
         <p:spPr>
           <a:xfrm>
-            <a:off x="6061991" y="4876749"/>
+            <a:off x="4348804" y="4592969"/>
             <a:ext cx="712271" cy="492423"/>
           </a:xfrm>
           <a:prstGeom prst="rect">
@@ -3870,7 +3924,14 @@
           <a:lstStyle/>
           <a:p>
             <a:pPr algn="ctr"/>
-            <a:endParaRPr lang="en-US"/>
+            <a:r>
+              <a:rPr lang="en-US" sz="1400" dirty="0">
+                <a:solidFill>
+                  <a:schemeClr val="accent3"/>
+                </a:solidFill>
+              </a:rPr>
+              <a:t>File 2</a:t>
+            </a:r>
           </a:p>
         </p:txBody>
       </p:sp>
@@ -3888,7 +3949,7 @@
         </p:nvSpPr>
         <p:spPr>
           <a:xfrm>
-            <a:off x="6061991" y="4312873"/>
+            <a:off x="4348804" y="4029093"/>
             <a:ext cx="712271" cy="492423"/>
           </a:xfrm>
           <a:prstGeom prst="rect">
@@ -3927,7 +3988,14 @@
           <a:lstStyle/>
           <a:p>
             <a:pPr algn="ctr"/>
-            <a:endParaRPr lang="en-US" b="1" dirty="0"/>
+            <a:r>
+              <a:rPr lang="en-US" sz="1400" dirty="0">
+                <a:solidFill>
+                  <a:schemeClr val="accent3"/>
+                </a:solidFill>
+              </a:rPr>
+              <a:t>File 1 </a:t>
+            </a:r>
           </a:p>
         </p:txBody>
       </p:sp>
@@ -3945,8 +4013,8 @@
         </p:nvSpPr>
         <p:spPr>
           <a:xfrm>
-            <a:off x="3871215" y="3379649"/>
-            <a:ext cx="1116011" cy="369332"/>
+            <a:off x="2270140" y="3129466"/>
+            <a:ext cx="1010213" cy="338554"/>
           </a:xfrm>
           <a:prstGeom prst="rect">
             <a:avLst/>
@@ -3954,13 +4022,13 @@
           <a:noFill/>
         </p:spPr>
         <p:txBody>
-          <a:bodyPr wrap="none" rtlCol="0">
+          <a:bodyPr wrap="square" rtlCol="0">
             <a:spAutoFit/>
           </a:bodyPr>
           <a:lstStyle/>
           <a:p>
             <a:r>
-              <a:rPr lang="en-US" dirty="0">
+              <a:rPr lang="en-US" sz="1600" dirty="0">
                 <a:solidFill>
                   <a:schemeClr val="accent2"/>
                 </a:solidFill>
@@ -3984,8 +4052,8 @@
         </p:nvSpPr>
         <p:spPr>
           <a:xfrm>
-            <a:off x="4932184" y="3519592"/>
-            <a:ext cx="1116011" cy="369332"/>
+            <a:off x="3227780" y="3286716"/>
+            <a:ext cx="1010213" cy="338554"/>
           </a:xfrm>
           <a:prstGeom prst="rect">
             <a:avLst/>
@@ -3999,7 +4067,7 @@
           <a:lstStyle/>
           <a:p>
             <a:r>
-              <a:rPr lang="en-US" dirty="0">
+              <a:rPr lang="en-US" sz="1600" dirty="0">
                 <a:solidFill>
                   <a:schemeClr val="accent4"/>
                 </a:solidFill>
@@ -4023,8 +4091,8 @@
         </p:nvSpPr>
         <p:spPr>
           <a:xfrm>
-            <a:off x="5860122" y="3984007"/>
-            <a:ext cx="1116011" cy="369332"/>
+            <a:off x="4199832" y="3670733"/>
+            <a:ext cx="1010213" cy="338554"/>
           </a:xfrm>
           <a:prstGeom prst="rect">
             <a:avLst/>
@@ -4038,7 +4106,7 @@
           <a:lstStyle/>
           <a:p>
             <a:r>
-              <a:rPr lang="en-US" dirty="0">
+              <a:rPr lang="en-US" sz="1600" dirty="0">
                 <a:solidFill>
                   <a:schemeClr val="accent3"/>
                 </a:solidFill>
@@ -4062,8 +4130,8 @@
         </p:nvSpPr>
         <p:spPr>
           <a:xfrm>
-            <a:off x="7284156" y="2158611"/>
-            <a:ext cx="1985252" cy="2009462"/>
+            <a:off x="5508136" y="1883134"/>
+            <a:ext cx="1985252" cy="1403581"/>
           </a:xfrm>
           <a:prstGeom prst="rect">
             <a:avLst/>
@@ -4101,12 +4169,12 @@
           <a:lstStyle/>
           <a:p>
             <a:r>
-              <a:rPr lang="en-US" dirty="0">
+              <a:rPr lang="en-US" sz="1600" dirty="0">
                 <a:solidFill>
                   <a:schemeClr val="tx1"/>
                 </a:solidFill>
               </a:rPr>
-              <a:t>Sample Analyses</a:t>
+              <a:t>Single-sample Analyses</a:t>
             </a:r>
           </a:p>
           <a:p>
@@ -4115,7 +4183,7 @@
               <a:buChar char="•"/>
             </a:pPr>
             <a:r>
-              <a:rPr lang="en-US" dirty="0">
+              <a:rPr lang="en-US" sz="1400" dirty="0">
                 <a:solidFill>
                   <a:schemeClr val="tx1"/>
                 </a:solidFill>
@@ -4129,7 +4197,7 @@
               <a:buChar char="•"/>
             </a:pPr>
             <a:r>
-              <a:rPr lang="en-US" dirty="0">
+              <a:rPr lang="en-US" sz="1400" dirty="0">
                 <a:solidFill>
                   <a:schemeClr val="tx1"/>
                 </a:solidFill>
@@ -4143,7 +4211,7 @@
               <a:buChar char="•"/>
             </a:pPr>
             <a:r>
-              <a:rPr lang="en-US" dirty="0">
+              <a:rPr lang="en-US" sz="1400" dirty="0">
                 <a:solidFill>
                   <a:schemeClr val="tx1"/>
                 </a:solidFill>
@@ -4157,7 +4225,7 @@
               <a:buChar char="•"/>
             </a:pPr>
             <a:r>
-              <a:rPr lang="en-US" dirty="0">
+              <a:rPr lang="en-US" sz="1400" dirty="0">
                 <a:solidFill>
                   <a:schemeClr val="tx1"/>
                 </a:solidFill>
@@ -4181,8 +4249,8 @@
         </p:nvSpPr>
         <p:spPr>
           <a:xfrm>
-            <a:off x="7300356" y="4507807"/>
-            <a:ext cx="1969051" cy="1504038"/>
+            <a:off x="5508136" y="3429000"/>
+            <a:ext cx="1985252" cy="868272"/>
           </a:xfrm>
           <a:prstGeom prst="rect">
             <a:avLst/>
@@ -4255,7 +4323,7 @@
           <a:lstStyle/>
           <a:p>
             <a:r>
-              <a:rPr lang="en-US" dirty="0">
+              <a:rPr lang="en-US" sz="1600" dirty="0">
                 <a:solidFill>
                   <a:schemeClr val="tx1"/>
                 </a:solidFill>
@@ -4269,7 +4337,7 @@
               <a:buChar char="•"/>
             </a:pPr>
             <a:r>
-              <a:rPr lang="en-US" dirty="0">
+              <a:rPr lang="en-US" sz="1400" dirty="0">
                 <a:solidFill>
                   <a:schemeClr val="tx1"/>
                 </a:solidFill>
@@ -4290,14 +4358,15 @@
           </p:cNvPr>
           <p:cNvCxnSpPr>
             <a:cxnSpLocks/>
+            <a:stCxn id="20" idx="3"/>
             <a:endCxn id="23" idx="1"/>
           </p:cNvCxnSpPr>
           <p:nvPr/>
         </p:nvCxnSpPr>
         <p:spPr>
           <a:xfrm flipV="1">
-            <a:off x="4932184" y="3163342"/>
-            <a:ext cx="2351972" cy="355977"/>
+            <a:off x="3280353" y="2584925"/>
+            <a:ext cx="2227783" cy="713818"/>
           </a:xfrm>
           <a:prstGeom prst="straightConnector1">
             <a:avLst/>
@@ -4333,14 +4402,14 @@
           <p:cNvCxnSpPr>
             <a:cxnSpLocks/>
             <a:stCxn id="21" idx="3"/>
-            <a:endCxn id="24" idx="0"/>
+            <a:endCxn id="24" idx="1"/>
           </p:cNvCxnSpPr>
           <p:nvPr/>
         </p:nvCxnSpPr>
         <p:spPr>
           <a:xfrm>
-            <a:off x="6048195" y="3704258"/>
-            <a:ext cx="2236687" cy="803549"/>
+            <a:off x="4237993" y="3455993"/>
+            <a:ext cx="1270143" cy="407143"/>
           </a:xfrm>
           <a:prstGeom prst="straightConnector1">
             <a:avLst/>
@@ -4376,14 +4445,202 @@
           <p:cNvCxnSpPr>
             <a:cxnSpLocks/>
             <a:stCxn id="22" idx="3"/>
-            <a:endCxn id="24" idx="0"/>
+            <a:endCxn id="24" idx="1"/>
           </p:cNvCxnSpPr>
           <p:nvPr/>
         </p:nvCxnSpPr>
         <p:spPr>
           <a:xfrm>
-            <a:off x="6976133" y="4168673"/>
-            <a:ext cx="1308749" cy="339134"/>
+            <a:off x="5210045" y="3840010"/>
+            <a:ext cx="298091" cy="23126"/>
+          </a:xfrm>
+          <a:prstGeom prst="straightConnector1">
+            <a:avLst/>
+          </a:prstGeom>
+          <a:ln>
+            <a:tailEnd type="triangle"/>
+          </a:ln>
+        </p:spPr>
+        <p:style>
+          <a:lnRef idx="2">
+            <a:schemeClr val="accent3"/>
+          </a:lnRef>
+          <a:fillRef idx="0">
+            <a:schemeClr val="accent3"/>
+          </a:fillRef>
+          <a:effectRef idx="1">
+            <a:schemeClr val="accent3"/>
+          </a:effectRef>
+          <a:fontRef idx="minor">
+            <a:schemeClr val="tx1"/>
+          </a:fontRef>
+        </p:style>
+      </p:cxnSp>
+      <p:sp>
+        <p:nvSpPr>
+          <p:cNvPr id="33" name="Rectangle 32">
+            <a:extLst>
+              <a:ext uri="{FF2B5EF4-FFF2-40B4-BE49-F238E27FC236}">
+                <a16:creationId xmlns:a16="http://schemas.microsoft.com/office/drawing/2014/main" id="{D70CA03D-F708-069D-C7BB-D50FE5D61D1F}"/>
+              </a:ext>
+            </a:extLst>
+          </p:cNvPr>
+          <p:cNvSpPr/>
+          <p:nvPr/>
+        </p:nvSpPr>
+        <p:spPr>
+          <a:xfrm>
+            <a:off x="5508136" y="4383481"/>
+            <a:ext cx="1985252" cy="1350293"/>
+          </a:xfrm>
+          <a:prstGeom prst="rect">
+            <a:avLst/>
+          </a:prstGeom>
+          <a:solidFill>
+            <a:schemeClr val="accent1">
+              <a:lumMod val="20000"/>
+              <a:lumOff val="80000"/>
+            </a:schemeClr>
+          </a:solidFill>
+          <a:ln>
+            <a:solidFill>
+              <a:schemeClr val="accent1"/>
+            </a:solidFill>
+          </a:ln>
+        </p:spPr>
+        <p:style>
+          <a:lnRef idx="2">
+            <a:schemeClr val="accent1">
+              <a:shade val="15000"/>
+            </a:schemeClr>
+          </a:lnRef>
+          <a:fillRef idx="1">
+            <a:schemeClr val="accent1"/>
+          </a:fillRef>
+          <a:effectRef idx="0">
+            <a:schemeClr val="accent1"/>
+          </a:effectRef>
+          <a:fontRef idx="minor">
+            <a:schemeClr val="lt1"/>
+          </a:fontRef>
+        </p:style>
+        <p:txBody>
+          <a:bodyPr rtlCol="0" anchor="t"/>
+          <a:lstStyle/>
+          <a:p>
+            <a:r>
+              <a:rPr lang="en-US" dirty="0">
+                <a:solidFill>
+                  <a:schemeClr val="tx1"/>
+                </a:solidFill>
+              </a:rPr>
+              <a:t>Project reports and plots</a:t>
+            </a:r>
+          </a:p>
+          <a:p>
+            <a:pPr marL="285750" indent="-285750">
+              <a:buFont typeface="Arial" panose="020B0604020202020204" pitchFamily="34" charset="0"/>
+              <a:buChar char="•"/>
+            </a:pPr>
+            <a:r>
+              <a:rPr lang="en-US" sz="1400" dirty="0">
+                <a:solidFill>
+                  <a:schemeClr val="tx1"/>
+                </a:solidFill>
+                <a:latin typeface="Calibri" panose="020F0502020204030204" pitchFamily="34" charset="0"/>
+                <a:cs typeface="Calibri" panose="020F0502020204030204" pitchFamily="34" charset="0"/>
+              </a:rPr>
+              <a:t>Multi-sample reports</a:t>
+            </a:r>
+          </a:p>
+          <a:p>
+            <a:pPr marL="285750" indent="-285750">
+              <a:buFont typeface="Arial" panose="020B0604020202020204" pitchFamily="34" charset="0"/>
+              <a:buChar char="•"/>
+            </a:pPr>
+            <a:r>
+              <a:rPr lang="en-US" sz="1400" dirty="0">
+                <a:solidFill>
+                  <a:schemeClr val="tx1"/>
+                </a:solidFill>
+                <a:latin typeface="Calibri" panose="020F0502020204030204" pitchFamily="34" charset="0"/>
+                <a:cs typeface="Calibri" panose="020F0502020204030204" pitchFamily="34" charset="0"/>
+              </a:rPr>
+              <a:t>Multi-sample plots</a:t>
+            </a:r>
+          </a:p>
+          <a:p>
+            <a:endParaRPr lang="en-US" dirty="0">
+              <a:solidFill>
+                <a:schemeClr val="tx1"/>
+              </a:solidFill>
+            </a:endParaRPr>
+          </a:p>
+        </p:txBody>
+      </p:sp>
+      <p:cxnSp>
+        <p:nvCxnSpPr>
+          <p:cNvPr id="50" name="Straight Arrow Connector 49">
+            <a:extLst>
+              <a:ext uri="{FF2B5EF4-FFF2-40B4-BE49-F238E27FC236}">
+                <a16:creationId xmlns:a16="http://schemas.microsoft.com/office/drawing/2014/main" id="{A29C7A8B-D11C-F6F4-1171-7DF399CFA4FF}"/>
+              </a:ext>
+            </a:extLst>
+          </p:cNvPr>
+          <p:cNvCxnSpPr>
+            <a:cxnSpLocks/>
+            <a:stCxn id="21" idx="3"/>
+            <a:endCxn id="23" idx="1"/>
+          </p:cNvCxnSpPr>
+          <p:nvPr/>
+        </p:nvCxnSpPr>
+        <p:spPr>
+          <a:xfrm flipV="1">
+            <a:off x="4237993" y="2584925"/>
+            <a:ext cx="1270143" cy="871068"/>
+          </a:xfrm>
+          <a:prstGeom prst="straightConnector1">
+            <a:avLst/>
+          </a:prstGeom>
+          <a:ln>
+            <a:tailEnd type="triangle"/>
+          </a:ln>
+        </p:spPr>
+        <p:style>
+          <a:lnRef idx="2">
+            <a:schemeClr val="accent4"/>
+          </a:lnRef>
+          <a:fillRef idx="0">
+            <a:schemeClr val="accent4"/>
+          </a:fillRef>
+          <a:effectRef idx="1">
+            <a:schemeClr val="accent4"/>
+          </a:effectRef>
+          <a:fontRef idx="minor">
+            <a:schemeClr val="tx1"/>
+          </a:fontRef>
+        </p:style>
+      </p:cxnSp>
+      <p:cxnSp>
+        <p:nvCxnSpPr>
+          <p:cNvPr id="53" name="Straight Arrow Connector 52">
+            <a:extLst>
+              <a:ext uri="{FF2B5EF4-FFF2-40B4-BE49-F238E27FC236}">
+                <a16:creationId xmlns:a16="http://schemas.microsoft.com/office/drawing/2014/main" id="{B0A70AAE-27E3-6A7B-BA60-E1763C6F366B}"/>
+              </a:ext>
+            </a:extLst>
+          </p:cNvPr>
+          <p:cNvCxnSpPr>
+            <a:cxnSpLocks/>
+            <a:stCxn id="22" idx="3"/>
+            <a:endCxn id="23" idx="1"/>
+          </p:cNvCxnSpPr>
+          <p:nvPr/>
+        </p:nvCxnSpPr>
+        <p:spPr>
+          <a:xfrm flipV="1">
+            <a:off x="5210045" y="2584925"/>
+            <a:ext cx="298091" cy="1255085"/>
           </a:xfrm>
           <a:prstGeom prst="straightConnector1">
             <a:avLst/>

</xml_diff>